<commit_message>
add new survey responses
</commit_message>
<xml_diff>
--- a/docs/index.pptx
+++ b/docs/index.pptx
@@ -3117,12 +3117,12 @@
             </a:pPr>
             <a:r>
               <a:rPr/>
-              <a:t>Updated October 23, 2025</a:t>
+              <a:t>Updated October 24, 2025</a:t>
             </a:r>
             <a:br/>
             <a:r>
               <a:rPr/>
-              <a:t>N = 127</a:t>
+              <a:t>N = 129</a:t>
             </a:r>
           </a:p>
         </p:txBody>

</xml_diff>